<commit_message>
Fixed typo for final slides
</commit_message>
<xml_diff>
--- a/Project 4.pptx
+++ b/Project 4.pptx
@@ -4454,7 +4454,7 @@
         </a:fontRef>
       </dsp:style>
       <dsp:txBody>
-        <a:bodyPr spcFirstLastPara="0" vert="horz" wrap="square" lIns="140970" tIns="70485" rIns="140970" bIns="70485" numCol="1" spcCol="1270" anchor="ctr" anchorCtr="0">
+        <a:bodyPr spcFirstLastPara="0" vert="horz" wrap="square" lIns="137160" tIns="68580" rIns="137160" bIns="68580" numCol="1" spcCol="1270" anchor="ctr" anchorCtr="0">
           <a:noAutofit/>
         </a:bodyPr>
         <a:lstStyle/>
@@ -4473,7 +4473,7 @@
             <a:buNone/>
           </a:pPr>
           <a:r>
-            <a:rPr lang="en-US" sz="3700" kern="1200" spc="150" baseline="0">
+            <a:rPr lang="en-US" sz="3600" kern="1200" spc="150" baseline="0">
               <a:latin typeface="+mj-lt"/>
               <a:ea typeface="+mj-ea"/>
               <a:cs typeface="+mj-cs"/>
@@ -4619,12 +4619,12 @@
         </a:fontRef>
       </dsp:style>
       <dsp:txBody>
-        <a:bodyPr spcFirstLastPara="0" vert="horz" wrap="square" lIns="140970" tIns="70485" rIns="140970" bIns="70485" numCol="1" spcCol="1270" anchor="ctr" anchorCtr="0">
+        <a:bodyPr spcFirstLastPara="0" vert="horz" wrap="square" lIns="137160" tIns="68580" rIns="137160" bIns="68580" numCol="1" spcCol="1270" anchor="ctr" anchorCtr="0">
           <a:noAutofit/>
         </a:bodyPr>
         <a:lstStyle/>
         <a:p>
-          <a:pPr marL="0" lvl="0" indent="0" algn="ctr" defTabSz="1644650">
+          <a:pPr marL="0" lvl="0" indent="0" algn="ctr" defTabSz="1600200">
             <a:lnSpc>
               <a:spcPct val="90000"/>
             </a:lnSpc>
@@ -4637,7 +4637,7 @@
             <a:buNone/>
           </a:pPr>
           <a:r>
-            <a:rPr lang="en-US" sz="3700" kern="1200" spc="150" baseline="0">
+            <a:rPr lang="en-US" sz="3600" kern="1200" spc="150" baseline="0">
               <a:latin typeface="Tenorite"/>
               <a:ea typeface="+mn-ea"/>
               <a:cs typeface="+mn-cs"/>
@@ -4785,7 +4785,7 @@
         </a:fontRef>
       </dsp:style>
       <dsp:txBody>
-        <a:bodyPr spcFirstLastPara="0" vert="horz" wrap="square" lIns="140970" tIns="70485" rIns="140970" bIns="70485" numCol="1" spcCol="1270" anchor="ctr" anchorCtr="0">
+        <a:bodyPr spcFirstLastPara="0" vert="horz" wrap="square" lIns="137160" tIns="68580" rIns="137160" bIns="68580" numCol="1" spcCol="1270" anchor="ctr" anchorCtr="0">
           <a:noAutofit/>
         </a:bodyPr>
         <a:lstStyle/>
@@ -4803,7 +4803,7 @@
             <a:buNone/>
           </a:pPr>
           <a:r>
-            <a:rPr lang="en-US" sz="3700" kern="1200" spc="150" baseline="0">
+            <a:rPr lang="en-US" sz="3600" kern="1200" spc="150" baseline="0">
               <a:latin typeface="Tenorite"/>
               <a:ea typeface="+mn-ea"/>
               <a:cs typeface="+mn-cs"/>
@@ -4967,12 +4967,12 @@
         </a:fontRef>
       </dsp:style>
       <dsp:txBody>
-        <a:bodyPr spcFirstLastPara="0" vert="horz" wrap="square" lIns="140970" tIns="70485" rIns="140970" bIns="70485" numCol="1" spcCol="1270" anchor="ctr" anchorCtr="0">
+        <a:bodyPr spcFirstLastPara="0" vert="horz" wrap="square" lIns="137160" tIns="68580" rIns="137160" bIns="68580" numCol="1" spcCol="1270" anchor="ctr" anchorCtr="0">
           <a:noAutofit/>
         </a:bodyPr>
         <a:lstStyle/>
         <a:p>
-          <a:pPr marL="0" lvl="0" indent="0" algn="ctr" defTabSz="1644650">
+          <a:pPr marL="0" lvl="0" indent="0" algn="ctr" defTabSz="1600200">
             <a:lnSpc>
               <a:spcPct val="90000"/>
             </a:lnSpc>
@@ -4985,14 +4985,14 @@
             <a:buNone/>
           </a:pPr>
           <a:r>
-            <a:rPr lang="en-US" sz="3700" kern="1200" spc="150" baseline="0" dirty="0" err="1">
+            <a:rPr lang="en-US" sz="3600" kern="1200" spc="150" baseline="0" dirty="0" err="1">
               <a:latin typeface="Tenorite"/>
               <a:ea typeface="+mn-ea"/>
               <a:cs typeface="+mn-cs"/>
             </a:rPr>
             <a:t>Tensorflow</a:t>
           </a:r>
-          <a:endParaRPr lang="en-US" sz="3700" kern="1200" spc="150" baseline="0" dirty="0">
+          <a:endParaRPr lang="en-US" sz="3600" kern="1200" spc="150" baseline="0" dirty="0">
             <a:latin typeface="Tenorite"/>
             <a:ea typeface="+mn-ea"/>
             <a:cs typeface="+mn-cs"/>
@@ -5054,12 +5054,12 @@
         </a:fontRef>
       </dsp:style>
       <dsp:txBody>
-        <a:bodyPr spcFirstLastPara="0" vert="horz" wrap="square" lIns="140970" tIns="70485" rIns="140970" bIns="70485" numCol="1" spcCol="1270" anchor="ctr" anchorCtr="0">
+        <a:bodyPr spcFirstLastPara="0" vert="horz" wrap="square" lIns="137160" tIns="68580" rIns="137160" bIns="68580" numCol="1" spcCol="1270" anchor="ctr" anchorCtr="0">
           <a:noAutofit/>
         </a:bodyPr>
         <a:lstStyle/>
         <a:p>
-          <a:pPr marL="0" lvl="0" indent="0" algn="ctr" defTabSz="1644650">
+          <a:pPr marL="0" lvl="0" indent="0" algn="ctr" defTabSz="1600200">
             <a:lnSpc>
               <a:spcPct val="90000"/>
             </a:lnSpc>
@@ -5072,7 +5072,7 @@
             <a:buNone/>
           </a:pPr>
           <a:r>
-            <a:rPr lang="en-AU" sz="3700" kern="1200" dirty="0">
+            <a:rPr lang="en-AU" sz="3600" kern="1200" dirty="0">
               <a:latin typeface="+mj-lt"/>
             </a:rPr>
             <a:t>Tableau</a:t>
@@ -9305,7 +9305,7 @@
           <a:p>
             <a:fld id="{B56F32FC-4BD9-442A-A8C6-51598C909FE3}" type="datetimeFigureOut">
               <a:rPr lang="en-US" smtClean="0"/>
-              <a:t>1/29/2023</a:t>
+              <a:t>1/30/2023</a:t>
             </a:fld>
             <a:endParaRPr lang="en-US" dirty="0"/>
           </a:p>
@@ -9482,7 +9482,7 @@
           <a:p>
             <a:fld id="{056371FA-A98D-41E8-93F4-09945841298A}" type="datetimeFigureOut">
               <a:rPr lang="en-US" smtClean="0"/>
-              <a:t>1/29/2023</a:t>
+              <a:t>1/30/2023</a:t>
             </a:fld>
             <a:endParaRPr lang="en-US" dirty="0"/>
           </a:p>
@@ -20128,8 +20128,21 @@
                   <a:schemeClr val="tx1"/>
                 </a:solidFill>
               </a:rPr>
-              <a:t>Used to display the results of our activation functions</a:t>
-            </a:r>
+              <a:t>Used to display the results of our activation functions </a:t>
+            </a:r>
+            <a:r>
+              <a:rPr lang="en-AU" sz="1600">
+                <a:solidFill>
+                  <a:schemeClr val="tx1"/>
+                </a:solidFill>
+              </a:rPr>
+              <a:t>and accuracies</a:t>
+            </a:r>
+            <a:endParaRPr lang="en-AU" sz="1600" dirty="0">
+              <a:solidFill>
+                <a:schemeClr val="tx1"/>
+              </a:solidFill>
+            </a:endParaRPr>
           </a:p>
         </p:txBody>
       </p:sp>

</xml_diff>